<commit_message>
Parte prática ajustada com trace do OpenTelemetry
</commit_message>
<xml_diff>
--- a/ObservabilidadeDotnet.pptx
+++ b/ObservabilidadeDotnet.pptx
@@ -5,10 +5,10 @@
     <p:sldMasterId id="2147483648" r:id="rId1"/>
   </p:sldMasterIdLst>
   <p:notesMasterIdLst>
-    <p:notesMasterId r:id="rId10"/>
+    <p:notesMasterId r:id="rId12"/>
   </p:notesMasterIdLst>
   <p:handoutMasterIdLst>
-    <p:handoutMasterId r:id="rId11"/>
+    <p:handoutMasterId r:id="rId13"/>
   </p:handoutMasterIdLst>
   <p:sldIdLst>
     <p:sldId id="256" r:id="rId3"/>
@@ -16,8 +16,10 @@
     <p:sldId id="258" r:id="rId5"/>
     <p:sldId id="259" r:id="rId6"/>
     <p:sldId id="260" r:id="rId7"/>
-    <p:sldId id="261" r:id="rId8"/>
-    <p:sldId id="262" r:id="rId9"/>
+    <p:sldId id="263" r:id="rId8"/>
+    <p:sldId id="264" r:id="rId9"/>
+    <p:sldId id="261" r:id="rId10"/>
+    <p:sldId id="262" r:id="rId11"/>
   </p:sldIdLst>
   <p:sldSz cx="12192000" cy="6858000"/>
   <p:notesSz cx="7103745" cy="10234295"/>
@@ -4249,7 +4251,7 @@
             <a:pPr lvl="1"/>
             <a:r>
               <a:rPr lang="pt-BR" altLang="en-US"/>
-              <a:t>Sabe quantas vendas teve (negócio);</a:t>
+              <a:t>Saber quantas vendas teve (negócio);</a:t>
             </a:r>
             <a:endParaRPr lang="pt-BR" altLang="en-US"/>
           </a:p>
@@ -4365,38 +4367,31 @@
             <p:ph type="title"/>
           </p:nvPr>
         </p:nvSpPr>
+        <p:spPr/>
+        <p:txBody>
+          <a:bodyPr/>
+          <a:p>
+            <a:r>
+              <a:rPr lang="pt-BR" altLang="en-US"/>
+              <a:t>Pontos positivos</a:t>
+            </a:r>
+            <a:endParaRPr lang="pt-BR" altLang="en-US"/>
+          </a:p>
+        </p:txBody>
+      </p:sp>
+      <p:sp>
+        <p:nvSpPr>
+          <p:cNvPr id="3" name="Espaço Reservado para Conteúdo 2"/>
+          <p:cNvSpPr>
+            <a:spLocks noGrp="1"/>
+          </p:cNvSpPr>
+          <p:nvPr>
+            <p:ph idx="1"/>
+          </p:nvPr>
+        </p:nvSpPr>
         <p:spPr>
           <a:xfrm>
-            <a:off x="609600" y="304800"/>
-            <a:ext cx="10972800" cy="582613"/>
-          </a:xfrm>
-        </p:spPr>
-        <p:txBody>
-          <a:bodyPr/>
-          <a:p>
-            <a:r>
-              <a:rPr lang="pt-BR" altLang="en-US">
-                <a:sym typeface="+mn-ea"/>
-              </a:rPr>
-              <a:t>OpenTelemetry pode ajudar no processo de observabilidade</a:t>
-            </a:r>
-            <a:endParaRPr lang="pt-BR" altLang="en-US"/>
-          </a:p>
-        </p:txBody>
-      </p:sp>
-      <p:sp>
-        <p:nvSpPr>
-          <p:cNvPr id="3" name="Espaço Reservado para Conteúdo 2"/>
-          <p:cNvSpPr>
-            <a:spLocks noGrp="1"/>
-          </p:cNvSpPr>
-          <p:nvPr>
-            <p:ph idx="1"/>
-          </p:nvPr>
-        </p:nvSpPr>
-        <p:spPr>
-          <a:xfrm>
-            <a:off x="609600" y="1527175"/>
+            <a:off x="609600" y="1498600"/>
             <a:ext cx="10972800" cy="4953000"/>
           </a:xfrm>
         </p:spPr>
@@ -4405,25 +4400,15 @@
           <a:p>
             <a:r>
               <a:rPr lang="pt-BR" altLang="en-US"/>
-              <a:t>Projeto de código aberto e tem como objetivo fornecer uma plataforma padrão;</a:t>
+              <a:t>Facilita a detecção de problemas;</a:t>
             </a:r>
             <a:endParaRPr lang="pt-BR" altLang="en-US"/>
           </a:p>
           <a:p>
             <a:r>
               <a:rPr lang="pt-BR" altLang="en-US"/>
-              <a:t>Iniciado em maio de 2019 pela junção do projeto OpenCensus do Google e do projeto OpenTracing da CNCF (Cloud Native Computing Foundation)</a:t>
-            </a:r>
-            <a:endParaRPr lang="pt-BR" altLang="en-US"/>
-          </a:p>
-          <a:p>
-            <a:r>
-              <a:rPr lang="pt-BR" altLang="en-US"/>
-              <a:t>Para rastrear, monitorar e analisar o desempenho de aplicativos e serviços em nuvem;</a:t>
-            </a:r>
-            <a:endParaRPr lang="pt-BR" altLang="en-US"/>
-          </a:p>
-          <a:p>
+              <a:t>Permite a identificação de gargalos e oportunidades de otimização no desempenho da aplicação.</a:t>
+            </a:r>
             <a:endParaRPr lang="pt-BR" altLang="en-US"/>
           </a:p>
         </p:txBody>
@@ -4462,6 +4447,175 @@
           <a:p>
             <a:r>
               <a:rPr lang="pt-BR" altLang="en-US"/>
+              <a:t>Pontos negativos</a:t>
+            </a:r>
+            <a:endParaRPr lang="pt-BR" altLang="en-US"/>
+          </a:p>
+        </p:txBody>
+      </p:sp>
+      <p:sp>
+        <p:nvSpPr>
+          <p:cNvPr id="3" name="Espaço Reservado para Conteúdo 2"/>
+          <p:cNvSpPr>
+            <a:spLocks noGrp="1"/>
+          </p:cNvSpPr>
+          <p:nvPr>
+            <p:ph idx="1"/>
+          </p:nvPr>
+        </p:nvSpPr>
+        <p:spPr>
+          <a:xfrm>
+            <a:off x="609600" y="1489075"/>
+            <a:ext cx="10972800" cy="4953000"/>
+          </a:xfrm>
+        </p:spPr>
+        <p:txBody>
+          <a:bodyPr/>
+          <a:p>
+            <a:r>
+              <a:rPr lang="pt-BR" altLang="en-US"/>
+              <a:t>Requer investimento em ferramentas e infraestrutura para coleta e análise de dados;</a:t>
+            </a:r>
+            <a:endParaRPr lang="pt-BR" altLang="en-US"/>
+          </a:p>
+          <a:p>
+            <a:r>
+              <a:rPr lang="pt-BR" altLang="en-US"/>
+              <a:t>Pode gerar sobrecarga no sistema devido ao alto volume de dados coletados;</a:t>
+            </a:r>
+            <a:endParaRPr lang="pt-BR" altLang="en-US"/>
+          </a:p>
+          <a:p>
+            <a:r>
+              <a:rPr lang="pt-BR" altLang="en-US"/>
+              <a:t>Exige uma equipe capacitada para interpretar os dados coletados e tomar decisões com base neles.</a:t>
+            </a:r>
+            <a:endParaRPr lang="pt-BR" altLang="en-US"/>
+          </a:p>
+        </p:txBody>
+      </p:sp>
+    </p:spTree>
+  </p:cSld>
+  <p:clrMapOvr>
+    <a:masterClrMapping/>
+  </p:clrMapOvr>
+</p:sld>
+</file>
+
+<file path=ppt/slides/slide8.xml><?xml version="1.0" encoding="utf-8"?>
+<p:sld xmlns:a="http://schemas.openxmlformats.org/drawingml/2006/main" xmlns:r="http://schemas.openxmlformats.org/officeDocument/2006/relationships" xmlns:p="http://schemas.openxmlformats.org/presentationml/2006/main">
+  <p:cSld>
+    <p:spTree>
+      <p:nvGrpSpPr>
+        <p:cNvPr id="1" name=""/>
+        <p:cNvGrpSpPr/>
+        <p:nvPr/>
+      </p:nvGrpSpPr>
+      <p:grpSpPr/>
+      <p:sp>
+        <p:nvSpPr>
+          <p:cNvPr id="2" name="Título 1"/>
+          <p:cNvSpPr>
+            <a:spLocks noGrp="1"/>
+          </p:cNvSpPr>
+          <p:nvPr>
+            <p:ph type="title"/>
+          </p:nvPr>
+        </p:nvSpPr>
+        <p:spPr>
+          <a:xfrm>
+            <a:off x="609600" y="304800"/>
+            <a:ext cx="10972800" cy="582613"/>
+          </a:xfrm>
+        </p:spPr>
+        <p:txBody>
+          <a:bodyPr/>
+          <a:p>
+            <a:r>
+              <a:rPr lang="pt-BR" altLang="en-US">
+                <a:sym typeface="+mn-ea"/>
+              </a:rPr>
+              <a:t>OpenTelemetry</a:t>
+            </a:r>
+            <a:endParaRPr lang="pt-BR" altLang="en-US"/>
+          </a:p>
+        </p:txBody>
+      </p:sp>
+      <p:sp>
+        <p:nvSpPr>
+          <p:cNvPr id="3" name="Espaço Reservado para Conteúdo 2"/>
+          <p:cNvSpPr>
+            <a:spLocks noGrp="1"/>
+          </p:cNvSpPr>
+          <p:nvPr>
+            <p:ph idx="1"/>
+          </p:nvPr>
+        </p:nvSpPr>
+        <p:spPr>
+          <a:xfrm>
+            <a:off x="609600" y="1527175"/>
+            <a:ext cx="10972800" cy="4953000"/>
+          </a:xfrm>
+        </p:spPr>
+        <p:txBody>
+          <a:bodyPr/>
+          <a:p>
+            <a:r>
+              <a:rPr lang="pt-BR" altLang="en-US"/>
+              <a:t>Framework de observabilidade para softwares cloud native;</a:t>
+            </a:r>
+            <a:endParaRPr lang="pt-BR" altLang="en-US"/>
+          </a:p>
+          <a:p>
+            <a:r>
+              <a:rPr lang="pt-BR" altLang="en-US"/>
+              <a:t>Projeto de código aberto e tem como objetivo fornecer uma plataforma padrão;</a:t>
+            </a:r>
+            <a:endParaRPr lang="pt-BR" altLang="en-US"/>
+          </a:p>
+          <a:p>
+            <a:r>
+              <a:rPr lang="pt-BR" altLang="en-US"/>
+              <a:t>Iniciado em maio de 2019 pela junção do projeto OpenCensus do Google e do projeto OpenTracing da CNCF (Cloud Native Computing Foundation).</a:t>
+            </a:r>
+            <a:endParaRPr lang="pt-BR" altLang="en-US"/>
+          </a:p>
+        </p:txBody>
+      </p:sp>
+    </p:spTree>
+  </p:cSld>
+  <p:clrMapOvr>
+    <a:masterClrMapping/>
+  </p:clrMapOvr>
+</p:sld>
+</file>
+
+<file path=ppt/slides/slide9.xml><?xml version="1.0" encoding="utf-8"?>
+<p:sld xmlns:a="http://schemas.openxmlformats.org/drawingml/2006/main" xmlns:r="http://schemas.openxmlformats.org/officeDocument/2006/relationships" xmlns:p="http://schemas.openxmlformats.org/presentationml/2006/main">
+  <p:cSld>
+    <p:spTree>
+      <p:nvGrpSpPr>
+        <p:cNvPr id="1" name=""/>
+        <p:cNvGrpSpPr/>
+        <p:nvPr/>
+      </p:nvGrpSpPr>
+      <p:grpSpPr/>
+      <p:sp>
+        <p:nvSpPr>
+          <p:cNvPr id="2" name="Título 1"/>
+          <p:cNvSpPr>
+            <a:spLocks noGrp="1"/>
+          </p:cNvSpPr>
+          <p:nvPr>
+            <p:ph type="title"/>
+          </p:nvPr>
+        </p:nvSpPr>
+        <p:spPr/>
+        <p:txBody>
+          <a:bodyPr/>
+          <a:p>
+            <a:r>
+              <a:rPr lang="pt-BR" altLang="en-US"/>
               <a:t>Demonstração prática</a:t>
             </a:r>
             <a:endParaRPr lang="pt-BR" altLang="en-US"/>
@@ -4478,13 +4632,18 @@
             <p:ph idx="1"/>
           </p:nvPr>
         </p:nvSpPr>
-        <p:spPr/>
+        <p:spPr>
+          <a:xfrm>
+            <a:off x="609600" y="1508125"/>
+            <a:ext cx="10972800" cy="4953000"/>
+          </a:xfrm>
+        </p:spPr>
         <p:txBody>
           <a:bodyPr/>
           <a:p>
             <a:r>
               <a:rPr lang="pt-BR" altLang="en-US"/>
-              <a:t>Este é um simples projeto de demonstração de observabilidade em uma aplicação Asp net core 6 utilizando o Elasticsearch como ferramenta de armazenamento e análise de logs e métricas;</a:t>
+              <a:t>Este é um simples projeto de demonstração de conceitos da observabilidade em uma aplicação Asp net core 6 utilizando o Elasticsearch como ferramenta de armazenamento e análise de logs e métricas;</a:t>
             </a:r>
             <a:endParaRPr lang="pt-BR" altLang="en-US"/>
           </a:p>

</xml_diff>

<commit_message>
Adicionadas referências na apresentação
</commit_message>
<xml_diff>
--- a/ObservabilidadeDotnet.pptx
+++ b/ObservabilidadeDotnet.pptx
@@ -5,10 +5,10 @@
     <p:sldMasterId id="2147483648" r:id="rId1"/>
   </p:sldMasterIdLst>
   <p:notesMasterIdLst>
-    <p:notesMasterId r:id="rId12"/>
+    <p:notesMasterId r:id="rId13"/>
   </p:notesMasterIdLst>
   <p:handoutMasterIdLst>
-    <p:handoutMasterId r:id="rId13"/>
+    <p:handoutMasterId r:id="rId14"/>
   </p:handoutMasterIdLst>
   <p:sldIdLst>
     <p:sldId id="256" r:id="rId3"/>
@@ -19,7 +19,8 @@
     <p:sldId id="263" r:id="rId8"/>
     <p:sldId id="264" r:id="rId9"/>
     <p:sldId id="261" r:id="rId10"/>
-    <p:sldId id="262" r:id="rId11"/>
+    <p:sldId id="267" r:id="rId11"/>
+    <p:sldId id="262" r:id="rId12"/>
   </p:sldIdLst>
   <p:sldSz cx="12192000" cy="6858000"/>
   <p:notesSz cx="7103745" cy="10234295"/>
@@ -3984,6 +3985,81 @@
 </p:sld>
 </file>
 
+<file path=ppt/slides/slide10.xml><?xml version="1.0" encoding="utf-8"?>
+<p:sld xmlns:a="http://schemas.openxmlformats.org/drawingml/2006/main" xmlns:r="http://schemas.openxmlformats.org/officeDocument/2006/relationships" xmlns:p="http://schemas.openxmlformats.org/presentationml/2006/main">
+  <p:cSld>
+    <p:spTree>
+      <p:nvGrpSpPr>
+        <p:cNvPr id="1" name=""/>
+        <p:cNvGrpSpPr/>
+        <p:nvPr/>
+      </p:nvGrpSpPr>
+      <p:grpSpPr/>
+      <p:sp>
+        <p:nvSpPr>
+          <p:cNvPr id="2" name="Título 1"/>
+          <p:cNvSpPr>
+            <a:spLocks noGrp="1"/>
+          </p:cNvSpPr>
+          <p:nvPr>
+            <p:ph type="title"/>
+          </p:nvPr>
+        </p:nvSpPr>
+        <p:spPr/>
+        <p:txBody>
+          <a:bodyPr/>
+          <a:p>
+            <a:r>
+              <a:rPr lang="pt-BR" altLang="en-US"/>
+              <a:t>Demonstração prática</a:t>
+            </a:r>
+            <a:endParaRPr lang="pt-BR" altLang="en-US"/>
+          </a:p>
+        </p:txBody>
+      </p:sp>
+      <p:sp>
+        <p:nvSpPr>
+          <p:cNvPr id="3" name="Espaço Reservado para Conteúdo 2"/>
+          <p:cNvSpPr>
+            <a:spLocks noGrp="1"/>
+          </p:cNvSpPr>
+          <p:nvPr>
+            <p:ph idx="1"/>
+          </p:nvPr>
+        </p:nvSpPr>
+        <p:spPr>
+          <a:xfrm>
+            <a:off x="609600" y="1508125"/>
+            <a:ext cx="10972800" cy="4953000"/>
+          </a:xfrm>
+        </p:spPr>
+        <p:txBody>
+          <a:bodyPr/>
+          <a:p>
+            <a:r>
+              <a:rPr lang="pt-BR" altLang="en-US"/>
+              <a:t>Este é um simples projeto de demonstração de conceitos da observabilidade em uma aplicação Asp net core 6 utilizando o Elasticsearch como ferramenta de armazenamento e análise de logs e métricas;</a:t>
+            </a:r>
+            <a:endParaRPr lang="pt-BR" altLang="en-US"/>
+          </a:p>
+          <a:p>
+            <a:pPr lvl="1"/>
+            <a:r>
+              <a:rPr lang="pt-BR" altLang="en-US"/>
+              <a:t>https://github.com/osniantonio/dotnetchapter01</a:t>
+            </a:r>
+            <a:endParaRPr lang="pt-BR" altLang="en-US"/>
+          </a:p>
+        </p:txBody>
+      </p:sp>
+    </p:spTree>
+  </p:cSld>
+  <p:clrMapOvr>
+    <a:masterClrMapping/>
+  </p:clrMapOvr>
+</p:sld>
+</file>
+
 <file path=ppt/slides/slide2.xml><?xml version="1.0" encoding="utf-8"?>
 <p:sld xmlns:a="http://schemas.openxmlformats.org/drawingml/2006/main" xmlns:r="http://schemas.openxmlformats.org/officeDocument/2006/relationships" xmlns:p="http://schemas.openxmlformats.org/presentationml/2006/main">
   <p:cSld>
@@ -4616,7 +4692,7 @@
           <a:p>
             <a:r>
               <a:rPr lang="pt-BR" altLang="en-US"/>
-              <a:t>Demonstração prática</a:t>
+              <a:t>Referências</a:t>
             </a:r>
             <a:endParaRPr lang="pt-BR" altLang="en-US"/>
           </a:p>
@@ -4632,18 +4708,13 @@
             <p:ph idx="1"/>
           </p:nvPr>
         </p:nvSpPr>
-        <p:spPr>
-          <a:xfrm>
-            <a:off x="609600" y="1508125"/>
-            <a:ext cx="10972800" cy="4953000"/>
-          </a:xfrm>
-        </p:spPr>
+        <p:spPr/>
         <p:txBody>
           <a:bodyPr/>
           <a:p>
             <a:r>
               <a:rPr lang="pt-BR" altLang="en-US"/>
-              <a:t>Este é um simples projeto de demonstração de conceitos da observabilidade em uma aplicação Asp net core 6 utilizando o Elasticsearch como ferramenta de armazenamento e análise de logs e métricas;</a:t>
+              <a:t>Sugestão de livro</a:t>
             </a:r>
             <a:endParaRPr lang="pt-BR" altLang="en-US"/>
           </a:p>
@@ -4651,7 +4722,15 @@
             <a:pPr lvl="1"/>
             <a:r>
               <a:rPr lang="pt-BR" altLang="en-US"/>
-              <a:t>https://github.com/osniantonio/dotnetchapter01</a:t>
+              <a:t>Distributed Systems Observability, de Cindy Sridharan, da Editora: O’reilly</a:t>
+            </a:r>
+            <a:endParaRPr lang="pt-BR" altLang="en-US"/>
+          </a:p>
+          <a:p>
+            <a:pPr lvl="1"/>
+            <a:r>
+              <a:rPr lang="pt-BR" altLang="en-US"/>
+              <a:t>OpenTelemetry: documentação oficial disponível em: https://opentelemetry.io/docs/</a:t>
             </a:r>
             <a:endParaRPr lang="pt-BR" altLang="en-US"/>
           </a:p>

</xml_diff>